<commit_message>
Ajout d'un slide matériel
</commit_message>
<xml_diff>
--- a/Com/Création et Utilisation d’un Billard Intelligent.pptx
+++ b/Com/Création et Utilisation d’un Billard Intelligent.pptx
@@ -9,10 +9,10 @@
     <p:sldId id="258" r:id="rId3"/>
     <p:sldId id="257" r:id="rId4"/>
     <p:sldId id="259" r:id="rId5"/>
-    <p:sldId id="260" r:id="rId6"/>
-    <p:sldId id="261" r:id="rId7"/>
-    <p:sldId id="262" r:id="rId8"/>
-    <p:sldId id="263" r:id="rId9"/>
+    <p:sldId id="261" r:id="rId6"/>
+    <p:sldId id="262" r:id="rId7"/>
+    <p:sldId id="263" r:id="rId8"/>
+    <p:sldId id="264" r:id="rId9"/>
   </p:sldIdLst>
   <p:sldSz cx="12192000" cy="6858000"/>
   <p:notesSz cx="6858000" cy="9144000"/>
@@ -622,7 +622,7 @@
             <a:fld id="{B61BEF0D-F0BB-DE4B-95CE-6DB70DBA9567}" type="datetimeFigureOut">
               <a:rPr lang="en-US" dirty="0"/>
               <a:pPr/>
-              <a:t>12/7/2014</a:t>
+              <a:t>12/10/2014</a:t>
             </a:fld>
             <a:endParaRPr lang="en-US" dirty="0"/>
           </a:p>
@@ -915,7 +915,7 @@
             <a:fld id="{B61BEF0D-F0BB-DE4B-95CE-6DB70DBA9567}" type="datetimeFigureOut">
               <a:rPr lang="en-US" dirty="0"/>
               <a:pPr/>
-              <a:t>12/7/2014</a:t>
+              <a:t>12/10/2014</a:t>
             </a:fld>
             <a:endParaRPr lang="en-US" dirty="0"/>
           </a:p>
@@ -1160,7 +1160,7 @@
             <a:fld id="{B61BEF0D-F0BB-DE4B-95CE-6DB70DBA9567}" type="datetimeFigureOut">
               <a:rPr lang="en-US" dirty="0"/>
               <a:pPr/>
-              <a:t>12/7/2014</a:t>
+              <a:t>12/10/2014</a:t>
             </a:fld>
             <a:endParaRPr lang="en-US" dirty="0"/>
           </a:p>
@@ -1697,7 +1697,7 @@
             <a:fld id="{B61BEF0D-F0BB-DE4B-95CE-6DB70DBA9567}" type="datetimeFigureOut">
               <a:rPr lang="en-US" dirty="0"/>
               <a:pPr/>
-              <a:t>12/7/2014</a:t>
+              <a:t>12/10/2014</a:t>
             </a:fld>
             <a:endParaRPr lang="en-US" dirty="0"/>
           </a:p>
@@ -1942,7 +1942,7 @@
             <a:fld id="{B61BEF0D-F0BB-DE4B-95CE-6DB70DBA9567}" type="datetimeFigureOut">
               <a:rPr lang="en-US" dirty="0"/>
               <a:pPr/>
-              <a:t>12/7/2014</a:t>
+              <a:t>12/10/2014</a:t>
             </a:fld>
             <a:endParaRPr lang="en-US" dirty="0"/>
           </a:p>
@@ -2471,7 +2471,7 @@
             <a:fld id="{B61BEF0D-F0BB-DE4B-95CE-6DB70DBA9567}" type="datetimeFigureOut">
               <a:rPr lang="en-US" dirty="0"/>
               <a:pPr/>
-              <a:t>12/7/2014</a:t>
+              <a:t>12/10/2014</a:t>
             </a:fld>
             <a:endParaRPr lang="en-US" dirty="0"/>
           </a:p>
@@ -2765,7 +2765,7 @@
             <a:fld id="{B61BEF0D-F0BB-DE4B-95CE-6DB70DBA9567}" type="datetimeFigureOut">
               <a:rPr lang="en-US" dirty="0"/>
               <a:pPr/>
-              <a:t>12/7/2014</a:t>
+              <a:t>12/10/2014</a:t>
             </a:fld>
             <a:endParaRPr lang="en-US" dirty="0"/>
           </a:p>
@@ -2936,7 +2936,7 @@
             <a:fld id="{B61BEF0D-F0BB-DE4B-95CE-6DB70DBA9567}" type="datetimeFigureOut">
               <a:rPr lang="en-US" dirty="0"/>
               <a:pPr/>
-              <a:t>12/7/2014</a:t>
+              <a:t>12/10/2014</a:t>
             </a:fld>
             <a:endParaRPr lang="en-US" dirty="0"/>
           </a:p>
@@ -3113,7 +3113,7 @@
             <a:fld id="{B61BEF0D-F0BB-DE4B-95CE-6DB70DBA9567}" type="datetimeFigureOut">
               <a:rPr lang="en-US" dirty="0"/>
               <a:pPr/>
-              <a:t>12/7/2014</a:t>
+              <a:t>12/10/2014</a:t>
             </a:fld>
             <a:endParaRPr lang="en-US" dirty="0"/>
           </a:p>
@@ -3280,7 +3280,7 @@
             <a:fld id="{B61BEF0D-F0BB-DE4B-95CE-6DB70DBA9567}" type="datetimeFigureOut">
               <a:rPr lang="en-US" dirty="0"/>
               <a:pPr/>
-              <a:t>12/7/2014</a:t>
+              <a:t>12/10/2014</a:t>
             </a:fld>
             <a:endParaRPr lang="en-US" dirty="0"/>
           </a:p>
@@ -3528,7 +3528,7 @@
             <a:fld id="{B61BEF0D-F0BB-DE4B-95CE-6DB70DBA9567}" type="datetimeFigureOut">
               <a:rPr lang="en-US" dirty="0"/>
               <a:pPr/>
-              <a:t>12/7/2014</a:t>
+              <a:t>12/10/2014</a:t>
             </a:fld>
             <a:endParaRPr lang="en-US" dirty="0"/>
           </a:p>
@@ -3822,7 +3822,7 @@
             <a:fld id="{B61BEF0D-F0BB-DE4B-95CE-6DB70DBA9567}" type="datetimeFigureOut">
               <a:rPr lang="en-US" dirty="0"/>
               <a:pPr/>
-              <a:t>12/7/2014</a:t>
+              <a:t>12/10/2014</a:t>
             </a:fld>
             <a:endParaRPr lang="en-US" dirty="0"/>
           </a:p>
@@ -4261,7 +4261,7 @@
             <a:fld id="{B61BEF0D-F0BB-DE4B-95CE-6DB70DBA9567}" type="datetimeFigureOut">
               <a:rPr lang="en-US" dirty="0"/>
               <a:pPr/>
-              <a:t>12/7/2014</a:t>
+              <a:t>12/10/2014</a:t>
             </a:fld>
             <a:endParaRPr lang="en-US" dirty="0"/>
           </a:p>
@@ -4376,7 +4376,7 @@
             <a:fld id="{B61BEF0D-F0BB-DE4B-95CE-6DB70DBA9567}" type="datetimeFigureOut">
               <a:rPr lang="en-US" dirty="0"/>
               <a:pPr/>
-              <a:t>12/7/2014</a:t>
+              <a:t>12/10/2014</a:t>
             </a:fld>
             <a:endParaRPr lang="en-US" dirty="0"/>
           </a:p>
@@ -4468,7 +4468,7 @@
             <a:fld id="{B61BEF0D-F0BB-DE4B-95CE-6DB70DBA9567}" type="datetimeFigureOut">
               <a:rPr lang="en-US" dirty="0"/>
               <a:pPr/>
-              <a:t>12/7/2014</a:t>
+              <a:t>12/10/2014</a:t>
             </a:fld>
             <a:endParaRPr lang="en-US" dirty="0"/>
           </a:p>
@@ -4748,7 +4748,7 @@
             <a:fld id="{B61BEF0D-F0BB-DE4B-95CE-6DB70DBA9567}" type="datetimeFigureOut">
               <a:rPr lang="en-US" dirty="0"/>
               <a:pPr/>
-              <a:t>12/7/2014</a:t>
+              <a:t>12/10/2014</a:t>
             </a:fld>
             <a:endParaRPr lang="en-US" dirty="0"/>
           </a:p>
@@ -5036,7 +5036,7 @@
             <a:fld id="{B61BEF0D-F0BB-DE4B-95CE-6DB70DBA9567}" type="datetimeFigureOut">
               <a:rPr lang="en-US" dirty="0"/>
               <a:pPr/>
-              <a:t>12/7/2014</a:t>
+              <a:t>12/10/2014</a:t>
             </a:fld>
             <a:endParaRPr lang="en-US" dirty="0"/>
           </a:p>
@@ -5563,7 +5563,7 @@
             <a:fld id="{B61BEF0D-F0BB-DE4B-95CE-6DB70DBA9567}" type="datetimeFigureOut">
               <a:rPr lang="en-US" dirty="0"/>
               <a:pPr/>
-              <a:t>12/7/2014</a:t>
+              <a:t>12/10/2014</a:t>
             </a:fld>
             <a:endParaRPr lang="en-US" dirty="0"/>
           </a:p>
@@ -6123,6 +6123,13 @@
   <p:clrMapOvr>
     <a:masterClrMapping/>
   </p:clrMapOvr>
+  <p:timing>
+    <p:tnLst>
+      <p:par>
+        <p:cTn id="1" dur="indefinite" restart="never" nodeType="tmRoot"/>
+      </p:par>
+    </p:tnLst>
+  </p:timing>
 </p:sld>
 </file>
 
@@ -6291,6 +6298,13 @@
   <p:clrMapOvr>
     <a:masterClrMapping/>
   </p:clrMapOvr>
+  <p:timing>
+    <p:tnLst>
+      <p:par>
+        <p:cTn id="1" dur="indefinite" restart="never" nodeType="tmRoot"/>
+      </p:par>
+    </p:tnLst>
+  </p:timing>
 </p:sld>
 </file>
 
@@ -6373,6 +6387,13 @@
   <p:clrMapOvr>
     <a:masterClrMapping/>
   </p:clrMapOvr>
+  <p:timing>
+    <p:tnLst>
+      <p:par>
+        <p:cTn id="1" dur="indefinite" restart="never" nodeType="tmRoot"/>
+      </p:par>
+    </p:tnLst>
+  </p:timing>
 </p:sld>
 </file>
 
@@ -6445,6 +6466,13 @@
   <p:clrMapOvr>
     <a:masterClrMapping/>
   </p:clrMapOvr>
+  <p:timing>
+    <p:tnLst>
+      <p:par>
+        <p:cTn id="1" dur="indefinite" restart="never" nodeType="tmRoot"/>
+      </p:par>
+    </p:tnLst>
+  </p:timing>
 </p:sld>
 </file>
 
@@ -6482,7 +6510,7 @@
           <a:p>
             <a:r>
               <a:rPr lang="fr-FR" dirty="0" smtClean="0"/>
-              <a:t>Organisation</a:t>
+              <a:t>Mode de communication</a:t>
             </a:r>
             <a:endParaRPr lang="fr-FR" dirty="0"/>
           </a:p>
@@ -6505,19 +6533,21 @@
           <a:p>
             <a:r>
               <a:rPr lang="fr-FR" dirty="0" smtClean="0"/>
-              <a:t>Jean-Guillaume : Boîtier, application</a:t>
-            </a:r>
-          </a:p>
-          <a:p>
+              <a:t>Interne : </a:t>
+            </a:r>
+            <a:r>
+              <a:rPr lang="fr-FR" dirty="0" err="1" smtClean="0"/>
+              <a:t>GitHub</a:t>
+            </a:r>
             <a:r>
               <a:rPr lang="fr-FR" dirty="0" smtClean="0"/>
-              <a:t>Bastien : Analyse d’image</a:t>
+              <a:t>, réunion hebdomadaire le lundi après midi</a:t>
             </a:r>
           </a:p>
           <a:p>
             <a:r>
               <a:rPr lang="fr-FR" dirty="0" smtClean="0"/>
-              <a:t>Guillaume : </a:t>
+              <a:t>Externe : Mail, autre?</a:t>
             </a:r>
             <a:endParaRPr lang="fr-FR" dirty="0"/>
           </a:p>
@@ -6526,13 +6556,20 @@
     </p:spTree>
     <p:extLst>
       <p:ext uri="{BB962C8B-B14F-4D97-AF65-F5344CB8AC3E}">
-        <p14:creationId xmlns:p14="http://schemas.microsoft.com/office/powerpoint/2010/main" val="3756877421"/>
+        <p14:creationId xmlns:p14="http://schemas.microsoft.com/office/powerpoint/2010/main" val="4200319819"/>
       </p:ext>
     </p:extLst>
   </p:cSld>
   <p:clrMapOvr>
     <a:masterClrMapping/>
   </p:clrMapOvr>
+  <p:timing>
+    <p:tnLst>
+      <p:par>
+        <p:cTn id="1" dur="indefinite" restart="never" nodeType="tmRoot"/>
+      </p:par>
+    </p:tnLst>
+  </p:timing>
 </p:sld>
 </file>
 
@@ -6570,7 +6607,7 @@
           <a:p>
             <a:r>
               <a:rPr lang="fr-FR" dirty="0" smtClean="0"/>
-              <a:t>Mode de communication</a:t>
+              <a:t>Attendus</a:t>
             </a:r>
             <a:endParaRPr lang="fr-FR" dirty="0"/>
           </a:p>
@@ -6593,18 +6630,13 @@
           <a:p>
             <a:r>
               <a:rPr lang="fr-FR" dirty="0" smtClean="0"/>
-              <a:t>Interne : </a:t>
-            </a:r>
-            <a:r>
-              <a:rPr lang="fr-FR" dirty="0" err="1" smtClean="0"/>
-              <a:t>GitHub</a:t>
-            </a:r>
-            <a:endParaRPr lang="fr-FR" dirty="0" smtClean="0"/>
+              <a:t>Système de tracé de trajectoires fonctionnel</a:t>
+            </a:r>
           </a:p>
           <a:p>
             <a:r>
               <a:rPr lang="fr-FR" dirty="0" smtClean="0"/>
-              <a:t>Externe : Mail</a:t>
+              <a:t>Solutions pour gérer les effets</a:t>
             </a:r>
             <a:endParaRPr lang="fr-FR" dirty="0"/>
           </a:p>
@@ -6613,13 +6645,20 @@
     </p:spTree>
     <p:extLst>
       <p:ext uri="{BB962C8B-B14F-4D97-AF65-F5344CB8AC3E}">
-        <p14:creationId xmlns:p14="http://schemas.microsoft.com/office/powerpoint/2010/main" val="4200319819"/>
+        <p14:creationId xmlns:p14="http://schemas.microsoft.com/office/powerpoint/2010/main" val="3327931340"/>
       </p:ext>
     </p:extLst>
   </p:cSld>
   <p:clrMapOvr>
     <a:masterClrMapping/>
   </p:clrMapOvr>
+  <p:timing>
+    <p:tnLst>
+      <p:par>
+        <p:cTn id="1" dur="indefinite" restart="never" nodeType="tmRoot"/>
+      </p:par>
+    </p:tnLst>
+  </p:timing>
 </p:sld>
 </file>
 
@@ -6657,7 +6696,7 @@
           <a:p>
             <a:r>
               <a:rPr lang="fr-FR" dirty="0" smtClean="0"/>
-              <a:t>Attendus</a:t>
+              <a:t>Où en sommes nous?</a:t>
             </a:r>
             <a:endParaRPr lang="fr-FR" dirty="0"/>
           </a:p>
@@ -6678,20 +6717,70 @@
           <a:bodyPr/>
           <a:lstStyle/>
           <a:p>
-            <a:endParaRPr lang="fr-FR" dirty="0"/>
+            <a:r>
+              <a:rPr lang="fr-FR" dirty="0" smtClean="0"/>
+              <a:t>Réalisation des fonctions sous Matlab</a:t>
+            </a:r>
+          </a:p>
+          <a:p>
+            <a:r>
+              <a:rPr lang="fr-FR" dirty="0" smtClean="0"/>
+              <a:t>Mise en place d’un </a:t>
+            </a:r>
+            <a:r>
+              <a:rPr lang="fr-FR" dirty="0" err="1" smtClean="0"/>
+              <a:t>GitHub</a:t>
+            </a:r>
+            <a:endParaRPr lang="fr-FR" dirty="0" smtClean="0"/>
+          </a:p>
+          <a:p>
+            <a:r>
+              <a:rPr lang="fr-FR" dirty="0" smtClean="0"/>
+              <a:t>Achat d’un </a:t>
+            </a:r>
+            <a:r>
+              <a:rPr lang="fr-FR" dirty="0" err="1" smtClean="0"/>
+              <a:t>Raspberry</a:t>
+            </a:r>
+            <a:r>
+              <a:rPr lang="fr-FR" dirty="0" smtClean="0"/>
+              <a:t> Pi B</a:t>
+            </a:r>
+            <a:r>
+              <a:rPr lang="fr-FR" dirty="0" smtClean="0"/>
+              <a:t>+ et installation de </a:t>
+            </a:r>
+            <a:r>
+              <a:rPr lang="fr-FR" dirty="0" err="1" smtClean="0"/>
+              <a:t>Raspbian</a:t>
+            </a:r>
+            <a:endParaRPr lang="fr-FR" dirty="0" smtClean="0"/>
+          </a:p>
+          <a:p>
+            <a:r>
+              <a:rPr lang="fr-FR" dirty="0" smtClean="0"/>
+              <a:t>Apprentissage du C++</a:t>
+            </a:r>
           </a:p>
         </p:txBody>
       </p:sp>
     </p:spTree>
     <p:extLst>
       <p:ext uri="{BB962C8B-B14F-4D97-AF65-F5344CB8AC3E}">
-        <p14:creationId xmlns:p14="http://schemas.microsoft.com/office/powerpoint/2010/main" val="3327931340"/>
+        <p14:creationId xmlns:p14="http://schemas.microsoft.com/office/powerpoint/2010/main" val="2302796592"/>
       </p:ext>
     </p:extLst>
   </p:cSld>
   <p:clrMapOvr>
     <a:masterClrMapping/>
   </p:clrMapOvr>
+  <p:timing>
+    <p:tnLst>
+      <p:par>
+        <p:cTn id="1" dur="indefinite" restart="never" nodeType="tmRoot"/>
+      </p:par>
+    </p:tnLst>
+  </p:timing>
 </p:sld>
 </file>
 
@@ -6729,7 +6818,7 @@
           <a:p>
             <a:r>
               <a:rPr lang="fr-FR" dirty="0" smtClean="0"/>
-              <a:t>Où en sommes nous?</a:t>
+              <a:t>Références pour la suite</a:t>
             </a:r>
             <a:endParaRPr lang="fr-FR" dirty="0"/>
           </a:p>
@@ -6751,58 +6840,21 @@
           <a:lstStyle/>
           <a:p>
             <a:r>
+              <a:rPr lang="fr-FR" dirty="0"/>
+              <a:t>http</a:t>
+            </a:r>
+            <a:r>
               <a:rPr lang="fr-FR" dirty="0" smtClean="0"/>
-              <a:t>Réalisation des fonctions sous</a:t>
-            </a:r>
-            <a:r>
-              <a:rPr lang="fr-FR" dirty="0" smtClean="0"/>
-              <a:t> </a:t>
-            </a:r>
-            <a:r>
-              <a:rPr lang="fr-FR" dirty="0" smtClean="0"/>
-              <a:t>Matlab</a:t>
-            </a:r>
-          </a:p>
-          <a:p>
-            <a:r>
-              <a:rPr lang="fr-FR" dirty="0" smtClean="0"/>
-              <a:t>Mise en place d’un </a:t>
-            </a:r>
-            <a:r>
-              <a:rPr lang="fr-FR" dirty="0" err="1" smtClean="0"/>
-              <a:t>GitHub</a:t>
-            </a:r>
-            <a:r>
-              <a:rPr lang="fr-FR" dirty="0" smtClean="0"/>
-              <a:t>, prise en main</a:t>
-            </a:r>
-          </a:p>
-          <a:p>
-            <a:r>
-              <a:rPr lang="fr-FR" dirty="0" smtClean="0"/>
-              <a:t>Achat d’un </a:t>
-            </a:r>
-            <a:r>
-              <a:rPr lang="fr-FR" dirty="0" err="1" smtClean="0"/>
-              <a:t>Raspberry</a:t>
-            </a:r>
-            <a:r>
-              <a:rPr lang="fr-FR" dirty="0" smtClean="0"/>
-              <a:t> Pi</a:t>
-            </a:r>
-          </a:p>
-          <a:p>
-            <a:r>
-              <a:rPr lang="fr-FR" dirty="0" smtClean="0"/>
-              <a:t>Apprentissage du Python</a:t>
-            </a:r>
+              <a:t>://raspbian-france.fr/</a:t>
+            </a:r>
+            <a:endParaRPr lang="fr-FR" dirty="0"/>
           </a:p>
         </p:txBody>
       </p:sp>
     </p:spTree>
     <p:extLst>
       <p:ext uri="{BB962C8B-B14F-4D97-AF65-F5344CB8AC3E}">
-        <p14:creationId xmlns:p14="http://schemas.microsoft.com/office/powerpoint/2010/main" val="2302796592"/>
+        <p14:creationId xmlns:p14="http://schemas.microsoft.com/office/powerpoint/2010/main" val="3927050230"/>
       </p:ext>
     </p:extLst>
   </p:cSld>

</xml_diff>

<commit_message>
Nouvelle branche raspberry réservée au programme à faire tourner sur le Raspberry et au modélio qui va avec.
</commit_message>
<xml_diff>
--- a/Com/Création et Utilisation d’un Billard Intelligent.pptx
+++ b/Com/Création et Utilisation d’un Billard Intelligent.pptx
@@ -10,9 +10,9 @@
     <p:sldId id="257" r:id="rId4"/>
     <p:sldId id="259" r:id="rId5"/>
     <p:sldId id="261" r:id="rId6"/>
-    <p:sldId id="262" r:id="rId7"/>
-    <p:sldId id="263" r:id="rId8"/>
-    <p:sldId id="264" r:id="rId9"/>
+    <p:sldId id="266" r:id="rId7"/>
+    <p:sldId id="262" r:id="rId8"/>
+    <p:sldId id="263" r:id="rId9"/>
   </p:sldIdLst>
   <p:sldSz cx="12192000" cy="6858000"/>
   <p:notesSz cx="6858000" cy="9144000"/>
@@ -622,7 +622,7 @@
             <a:fld id="{B61BEF0D-F0BB-DE4B-95CE-6DB70DBA9567}" type="datetimeFigureOut">
               <a:rPr lang="en-US" dirty="0"/>
               <a:pPr/>
-              <a:t>12/10/2014</a:t>
+              <a:t>12/13/2014</a:t>
             </a:fld>
             <a:endParaRPr lang="en-US" dirty="0"/>
           </a:p>
@@ -915,7 +915,7 @@
             <a:fld id="{B61BEF0D-F0BB-DE4B-95CE-6DB70DBA9567}" type="datetimeFigureOut">
               <a:rPr lang="en-US" dirty="0"/>
               <a:pPr/>
-              <a:t>12/10/2014</a:t>
+              <a:t>12/13/2014</a:t>
             </a:fld>
             <a:endParaRPr lang="en-US" dirty="0"/>
           </a:p>
@@ -1160,7 +1160,7 @@
             <a:fld id="{B61BEF0D-F0BB-DE4B-95CE-6DB70DBA9567}" type="datetimeFigureOut">
               <a:rPr lang="en-US" dirty="0"/>
               <a:pPr/>
-              <a:t>12/10/2014</a:t>
+              <a:t>12/13/2014</a:t>
             </a:fld>
             <a:endParaRPr lang="en-US" dirty="0"/>
           </a:p>
@@ -1697,7 +1697,7 @@
             <a:fld id="{B61BEF0D-F0BB-DE4B-95CE-6DB70DBA9567}" type="datetimeFigureOut">
               <a:rPr lang="en-US" dirty="0"/>
               <a:pPr/>
-              <a:t>12/10/2014</a:t>
+              <a:t>12/13/2014</a:t>
             </a:fld>
             <a:endParaRPr lang="en-US" dirty="0"/>
           </a:p>
@@ -1942,7 +1942,7 @@
             <a:fld id="{B61BEF0D-F0BB-DE4B-95CE-6DB70DBA9567}" type="datetimeFigureOut">
               <a:rPr lang="en-US" dirty="0"/>
               <a:pPr/>
-              <a:t>12/10/2014</a:t>
+              <a:t>12/13/2014</a:t>
             </a:fld>
             <a:endParaRPr lang="en-US" dirty="0"/>
           </a:p>
@@ -2471,7 +2471,7 @@
             <a:fld id="{B61BEF0D-F0BB-DE4B-95CE-6DB70DBA9567}" type="datetimeFigureOut">
               <a:rPr lang="en-US" dirty="0"/>
               <a:pPr/>
-              <a:t>12/10/2014</a:t>
+              <a:t>12/13/2014</a:t>
             </a:fld>
             <a:endParaRPr lang="en-US" dirty="0"/>
           </a:p>
@@ -2765,7 +2765,7 @@
             <a:fld id="{B61BEF0D-F0BB-DE4B-95CE-6DB70DBA9567}" type="datetimeFigureOut">
               <a:rPr lang="en-US" dirty="0"/>
               <a:pPr/>
-              <a:t>12/10/2014</a:t>
+              <a:t>12/13/2014</a:t>
             </a:fld>
             <a:endParaRPr lang="en-US" dirty="0"/>
           </a:p>
@@ -2936,7 +2936,7 @@
             <a:fld id="{B61BEF0D-F0BB-DE4B-95CE-6DB70DBA9567}" type="datetimeFigureOut">
               <a:rPr lang="en-US" dirty="0"/>
               <a:pPr/>
-              <a:t>12/10/2014</a:t>
+              <a:t>12/13/2014</a:t>
             </a:fld>
             <a:endParaRPr lang="en-US" dirty="0"/>
           </a:p>
@@ -3113,7 +3113,7 @@
             <a:fld id="{B61BEF0D-F0BB-DE4B-95CE-6DB70DBA9567}" type="datetimeFigureOut">
               <a:rPr lang="en-US" dirty="0"/>
               <a:pPr/>
-              <a:t>12/10/2014</a:t>
+              <a:t>12/13/2014</a:t>
             </a:fld>
             <a:endParaRPr lang="en-US" dirty="0"/>
           </a:p>
@@ -3280,7 +3280,7 @@
             <a:fld id="{B61BEF0D-F0BB-DE4B-95CE-6DB70DBA9567}" type="datetimeFigureOut">
               <a:rPr lang="en-US" dirty="0"/>
               <a:pPr/>
-              <a:t>12/10/2014</a:t>
+              <a:t>12/13/2014</a:t>
             </a:fld>
             <a:endParaRPr lang="en-US" dirty="0"/>
           </a:p>
@@ -3528,7 +3528,7 @@
             <a:fld id="{B61BEF0D-F0BB-DE4B-95CE-6DB70DBA9567}" type="datetimeFigureOut">
               <a:rPr lang="en-US" dirty="0"/>
               <a:pPr/>
-              <a:t>12/10/2014</a:t>
+              <a:t>12/13/2014</a:t>
             </a:fld>
             <a:endParaRPr lang="en-US" dirty="0"/>
           </a:p>
@@ -3822,7 +3822,7 @@
             <a:fld id="{B61BEF0D-F0BB-DE4B-95CE-6DB70DBA9567}" type="datetimeFigureOut">
               <a:rPr lang="en-US" dirty="0"/>
               <a:pPr/>
-              <a:t>12/10/2014</a:t>
+              <a:t>12/13/2014</a:t>
             </a:fld>
             <a:endParaRPr lang="en-US" dirty="0"/>
           </a:p>
@@ -4261,7 +4261,7 @@
             <a:fld id="{B61BEF0D-F0BB-DE4B-95CE-6DB70DBA9567}" type="datetimeFigureOut">
               <a:rPr lang="en-US" dirty="0"/>
               <a:pPr/>
-              <a:t>12/10/2014</a:t>
+              <a:t>12/13/2014</a:t>
             </a:fld>
             <a:endParaRPr lang="en-US" dirty="0"/>
           </a:p>
@@ -4376,7 +4376,7 @@
             <a:fld id="{B61BEF0D-F0BB-DE4B-95CE-6DB70DBA9567}" type="datetimeFigureOut">
               <a:rPr lang="en-US" dirty="0"/>
               <a:pPr/>
-              <a:t>12/10/2014</a:t>
+              <a:t>12/13/2014</a:t>
             </a:fld>
             <a:endParaRPr lang="en-US" dirty="0"/>
           </a:p>
@@ -4468,7 +4468,7 @@
             <a:fld id="{B61BEF0D-F0BB-DE4B-95CE-6DB70DBA9567}" type="datetimeFigureOut">
               <a:rPr lang="en-US" dirty="0"/>
               <a:pPr/>
-              <a:t>12/10/2014</a:t>
+              <a:t>12/13/2014</a:t>
             </a:fld>
             <a:endParaRPr lang="en-US" dirty="0"/>
           </a:p>
@@ -4748,7 +4748,7 @@
             <a:fld id="{B61BEF0D-F0BB-DE4B-95CE-6DB70DBA9567}" type="datetimeFigureOut">
               <a:rPr lang="en-US" dirty="0"/>
               <a:pPr/>
-              <a:t>12/10/2014</a:t>
+              <a:t>12/13/2014</a:t>
             </a:fld>
             <a:endParaRPr lang="en-US" dirty="0"/>
           </a:p>
@@ -5036,7 +5036,7 @@
             <a:fld id="{B61BEF0D-F0BB-DE4B-95CE-6DB70DBA9567}" type="datetimeFigureOut">
               <a:rPr lang="en-US" dirty="0"/>
               <a:pPr/>
-              <a:t>12/10/2014</a:t>
+              <a:t>12/13/2014</a:t>
             </a:fld>
             <a:endParaRPr lang="en-US" dirty="0"/>
           </a:p>
@@ -5563,7 +5563,7 @@
             <a:fld id="{B61BEF0D-F0BB-DE4B-95CE-6DB70DBA9567}" type="datetimeFigureOut">
               <a:rPr lang="en-US" dirty="0"/>
               <a:pPr/>
-              <a:t>12/10/2014</a:t>
+              <a:t>12/13/2014</a:t>
             </a:fld>
             <a:endParaRPr lang="en-US" dirty="0"/>
           </a:p>
@@ -6607,7 +6607,7 @@
           <a:p>
             <a:r>
               <a:rPr lang="fr-FR" dirty="0" smtClean="0"/>
-              <a:t>Attendus</a:t>
+              <a:t>Matériel</a:t>
             </a:r>
             <a:endParaRPr lang="fr-FR" dirty="0"/>
           </a:p>
@@ -6630,13 +6630,82 @@
           <a:p>
             <a:r>
               <a:rPr lang="fr-FR" dirty="0" smtClean="0"/>
-              <a:t>Système de tracé de trajectoires fonctionnel</a:t>
-            </a:r>
-          </a:p>
-          <a:p>
+              <a:t>Webcam USB : à </a:t>
+            </a:r>
             <a:r>
               <a:rPr lang="fr-FR" dirty="0" smtClean="0"/>
-              <a:t>Solutions pour gérer les effets</a:t>
+              <a:t>choisir (</a:t>
+            </a:r>
+            <a:r>
+              <a:rPr lang="fr-FR" dirty="0" err="1" smtClean="0"/>
+              <a:t>SD</a:t>
+            </a:r>
+            <a:r>
+              <a:rPr lang="fr-FR" dirty="0" err="1" smtClean="0">
+                <a:sym typeface="Wingdings" panose="05000000000000000000" pitchFamily="2" charset="2"/>
+              </a:rPr>
+              <a:t>rapide</a:t>
+            </a:r>
+            <a:r>
+              <a:rPr lang="fr-FR" dirty="0" smtClean="0">
+                <a:sym typeface="Wingdings" panose="05000000000000000000" pitchFamily="2" charset="2"/>
+              </a:rPr>
+              <a:t> ou </a:t>
+            </a:r>
+            <a:r>
+              <a:rPr lang="fr-FR" dirty="0" err="1" smtClean="0">
+                <a:sym typeface="Wingdings" panose="05000000000000000000" pitchFamily="2" charset="2"/>
+              </a:rPr>
+              <a:t>HDprécis</a:t>
+            </a:r>
+            <a:r>
+              <a:rPr lang="fr-FR" dirty="0" smtClean="0">
+                <a:sym typeface="Wingdings" panose="05000000000000000000" pitchFamily="2" charset="2"/>
+              </a:rPr>
+              <a:t>)</a:t>
+            </a:r>
+            <a:endParaRPr lang="fr-FR" dirty="0" smtClean="0"/>
+          </a:p>
+          <a:p>
+            <a:r>
+              <a:rPr lang="fr-FR" dirty="0" err="1" smtClean="0"/>
+              <a:t>Raspberry</a:t>
+            </a:r>
+            <a:r>
+              <a:rPr lang="fr-FR" dirty="0" smtClean="0"/>
+              <a:t> Pi B+ : </a:t>
+            </a:r>
+          </a:p>
+          <a:p>
+            <a:pPr lvl="1"/>
+            <a:r>
+              <a:rPr lang="fr-FR" dirty="0" smtClean="0"/>
+              <a:t>carte micro SD de classe 4 actuellement (passer classe 10)?</a:t>
+            </a:r>
+          </a:p>
+          <a:p>
+            <a:pPr lvl="1"/>
+            <a:r>
+              <a:rPr lang="fr-FR" dirty="0" smtClean="0"/>
+              <a:t>Clé USB Wifi ou </a:t>
+            </a:r>
+            <a:r>
+              <a:rPr lang="fr-FR" dirty="0" err="1" smtClean="0"/>
+              <a:t>bluetooth</a:t>
+            </a:r>
+            <a:r>
+              <a:rPr lang="fr-FR" dirty="0" smtClean="0"/>
+              <a:t> pour connecter le système vers un téléphone ou un PC</a:t>
+            </a:r>
+          </a:p>
+          <a:p>
+            <a:r>
+              <a:rPr lang="fr-FR" dirty="0" smtClean="0"/>
+              <a:t>Projecteur : à </a:t>
+            </a:r>
+            <a:r>
+              <a:rPr lang="fr-FR" dirty="0" smtClean="0"/>
+              <a:t>choisir (port HDMI)</a:t>
             </a:r>
             <a:endParaRPr lang="fr-FR" dirty="0"/>
           </a:p>
@@ -6645,20 +6714,13 @@
     </p:spTree>
     <p:extLst>
       <p:ext uri="{BB962C8B-B14F-4D97-AF65-F5344CB8AC3E}">
-        <p14:creationId xmlns:p14="http://schemas.microsoft.com/office/powerpoint/2010/main" val="3327931340"/>
+        <p14:creationId xmlns:p14="http://schemas.microsoft.com/office/powerpoint/2010/main" val="2860016170"/>
       </p:ext>
     </p:extLst>
   </p:cSld>
   <p:clrMapOvr>
     <a:masterClrMapping/>
   </p:clrMapOvr>
-  <p:timing>
-    <p:tnLst>
-      <p:par>
-        <p:cTn id="1" dur="indefinite" restart="never" nodeType="tmRoot"/>
-      </p:par>
-    </p:tnLst>
-  </p:timing>
 </p:sld>
 </file>
 
@@ -6696,7 +6758,7 @@
           <a:p>
             <a:r>
               <a:rPr lang="fr-FR" dirty="0" smtClean="0"/>
-              <a:t>Où en sommes nous?</a:t>
+              <a:t>Attendus pour la prochaine soutenance</a:t>
             </a:r>
             <a:endParaRPr lang="fr-FR" dirty="0"/>
           </a:p>
@@ -6719,55 +6781,30 @@
           <a:p>
             <a:r>
               <a:rPr lang="fr-FR" dirty="0" smtClean="0"/>
-              <a:t>Réalisation des fonctions sous Matlab</a:t>
+              <a:t>Système de tracé de trajectoires fonctionnel</a:t>
             </a:r>
           </a:p>
           <a:p>
             <a:r>
               <a:rPr lang="fr-FR" dirty="0" smtClean="0"/>
-              <a:t>Mise en place d’un </a:t>
-            </a:r>
-            <a:r>
-              <a:rPr lang="fr-FR" dirty="0" err="1" smtClean="0"/>
-              <a:t>GitHub</a:t>
-            </a:r>
-            <a:endParaRPr lang="fr-FR" dirty="0" smtClean="0"/>
-          </a:p>
-          <a:p>
+              <a:t>Solutions </a:t>
+            </a:r>
             <a:r>
               <a:rPr lang="fr-FR" dirty="0" smtClean="0"/>
-              <a:t>Achat d’un </a:t>
-            </a:r>
-            <a:r>
-              <a:rPr lang="fr-FR" dirty="0" err="1" smtClean="0"/>
-              <a:t>Raspberry</a:t>
+              <a:t>envisageables pour </a:t>
             </a:r>
             <a:r>
               <a:rPr lang="fr-FR" dirty="0" smtClean="0"/>
-              <a:t> Pi B</a:t>
-            </a:r>
-            <a:r>
-              <a:rPr lang="fr-FR" dirty="0" smtClean="0"/>
-              <a:t>+ et installation de </a:t>
-            </a:r>
-            <a:r>
-              <a:rPr lang="fr-FR" dirty="0" err="1" smtClean="0"/>
-              <a:t>Raspbian</a:t>
-            </a:r>
-            <a:endParaRPr lang="fr-FR" dirty="0" smtClean="0"/>
-          </a:p>
-          <a:p>
-            <a:r>
-              <a:rPr lang="fr-FR" dirty="0" smtClean="0"/>
-              <a:t>Apprentissage du C++</a:t>
-            </a:r>
+              <a:t>gérer les effets</a:t>
+            </a:r>
+            <a:endParaRPr lang="fr-FR" dirty="0"/>
           </a:p>
         </p:txBody>
       </p:sp>
     </p:spTree>
     <p:extLst>
       <p:ext uri="{BB962C8B-B14F-4D97-AF65-F5344CB8AC3E}">
-        <p14:creationId xmlns:p14="http://schemas.microsoft.com/office/powerpoint/2010/main" val="2302796592"/>
+        <p14:creationId xmlns:p14="http://schemas.microsoft.com/office/powerpoint/2010/main" val="3327931340"/>
       </p:ext>
     </p:extLst>
   </p:cSld>
@@ -6818,7 +6855,7 @@
           <a:p>
             <a:r>
               <a:rPr lang="fr-FR" dirty="0" smtClean="0"/>
-              <a:t>Références pour la suite</a:t>
+              <a:t>Où en sommes nous?</a:t>
             </a:r>
             <a:endParaRPr lang="fr-FR" dirty="0"/>
           </a:p>
@@ -6840,27 +6877,65 @@
           <a:lstStyle/>
           <a:p>
             <a:r>
-              <a:rPr lang="fr-FR" dirty="0"/>
-              <a:t>http</a:t>
-            </a:r>
-            <a:r>
               <a:rPr lang="fr-FR" dirty="0" smtClean="0"/>
-              <a:t>://raspbian-france.fr/</a:t>
-            </a:r>
-            <a:endParaRPr lang="fr-FR" dirty="0"/>
+              <a:t>Réalisation des fonctions sous Matlab</a:t>
+            </a:r>
+          </a:p>
+          <a:p>
+            <a:r>
+              <a:rPr lang="fr-FR" dirty="0" smtClean="0"/>
+              <a:t>Mise en place d’un </a:t>
+            </a:r>
+            <a:r>
+              <a:rPr lang="fr-FR" dirty="0" err="1" smtClean="0"/>
+              <a:t>GitHub</a:t>
+            </a:r>
+            <a:endParaRPr lang="fr-FR" dirty="0" smtClean="0"/>
+          </a:p>
+          <a:p>
+            <a:r>
+              <a:rPr lang="fr-FR" dirty="0" smtClean="0"/>
+              <a:t>Achat d’un </a:t>
+            </a:r>
+            <a:r>
+              <a:rPr lang="fr-FR" dirty="0" err="1" smtClean="0"/>
+              <a:t>Raspberry</a:t>
+            </a:r>
+            <a:r>
+              <a:rPr lang="fr-FR" dirty="0" smtClean="0"/>
+              <a:t> Pi B+ et installation de </a:t>
+            </a:r>
+            <a:r>
+              <a:rPr lang="fr-FR" dirty="0" err="1" smtClean="0"/>
+              <a:t>Raspbian</a:t>
+            </a:r>
+            <a:endParaRPr lang="fr-FR" dirty="0" smtClean="0"/>
+          </a:p>
+          <a:p>
+            <a:r>
+              <a:rPr lang="fr-FR" dirty="0" smtClean="0"/>
+              <a:t>Apprentissage du C++</a:t>
+            </a:r>
           </a:p>
         </p:txBody>
       </p:sp>
     </p:spTree>
     <p:extLst>
       <p:ext uri="{BB962C8B-B14F-4D97-AF65-F5344CB8AC3E}">
-        <p14:creationId xmlns:p14="http://schemas.microsoft.com/office/powerpoint/2010/main" val="3927050230"/>
+        <p14:creationId xmlns:p14="http://schemas.microsoft.com/office/powerpoint/2010/main" val="2302796592"/>
       </p:ext>
     </p:extLst>
   </p:cSld>
   <p:clrMapOvr>
     <a:masterClrMapping/>
   </p:clrMapOvr>
+  <p:timing>
+    <p:tnLst>
+      <p:par>
+        <p:cTn id="1" dur="indefinite" restart="never" nodeType="tmRoot"/>
+      </p:par>
+    </p:tnLst>
+  </p:timing>
 </p:sld>
 </file>
 

</xml_diff>

<commit_message>
Remplissage du slide risques
</commit_message>
<xml_diff>
--- a/Com/Création et Utilisation d’un Billard Intelligent.pptx
+++ b/Com/Création et Utilisation d’un Billard Intelligent.pptx
@@ -622,7 +622,7 @@
             <a:fld id="{B61BEF0D-F0BB-DE4B-95CE-6DB70DBA9567}" type="datetimeFigureOut">
               <a:rPr lang="en-US" dirty="0"/>
               <a:pPr/>
-              <a:t>12/13/2014</a:t>
+              <a:t>12/14/2014</a:t>
             </a:fld>
             <a:endParaRPr lang="en-US" dirty="0"/>
           </a:p>
@@ -915,7 +915,7 @@
             <a:fld id="{B61BEF0D-F0BB-DE4B-95CE-6DB70DBA9567}" type="datetimeFigureOut">
               <a:rPr lang="en-US" dirty="0"/>
               <a:pPr/>
-              <a:t>12/13/2014</a:t>
+              <a:t>12/14/2014</a:t>
             </a:fld>
             <a:endParaRPr lang="en-US" dirty="0"/>
           </a:p>
@@ -1160,7 +1160,7 @@
             <a:fld id="{B61BEF0D-F0BB-DE4B-95CE-6DB70DBA9567}" type="datetimeFigureOut">
               <a:rPr lang="en-US" dirty="0"/>
               <a:pPr/>
-              <a:t>12/13/2014</a:t>
+              <a:t>12/14/2014</a:t>
             </a:fld>
             <a:endParaRPr lang="en-US" dirty="0"/>
           </a:p>
@@ -1697,7 +1697,7 @@
             <a:fld id="{B61BEF0D-F0BB-DE4B-95CE-6DB70DBA9567}" type="datetimeFigureOut">
               <a:rPr lang="en-US" dirty="0"/>
               <a:pPr/>
-              <a:t>12/13/2014</a:t>
+              <a:t>12/14/2014</a:t>
             </a:fld>
             <a:endParaRPr lang="en-US" dirty="0"/>
           </a:p>
@@ -1942,7 +1942,7 @@
             <a:fld id="{B61BEF0D-F0BB-DE4B-95CE-6DB70DBA9567}" type="datetimeFigureOut">
               <a:rPr lang="en-US" dirty="0"/>
               <a:pPr/>
-              <a:t>12/13/2014</a:t>
+              <a:t>12/14/2014</a:t>
             </a:fld>
             <a:endParaRPr lang="en-US" dirty="0"/>
           </a:p>
@@ -2471,7 +2471,7 @@
             <a:fld id="{B61BEF0D-F0BB-DE4B-95CE-6DB70DBA9567}" type="datetimeFigureOut">
               <a:rPr lang="en-US" dirty="0"/>
               <a:pPr/>
-              <a:t>12/13/2014</a:t>
+              <a:t>12/14/2014</a:t>
             </a:fld>
             <a:endParaRPr lang="en-US" dirty="0"/>
           </a:p>
@@ -2765,7 +2765,7 @@
             <a:fld id="{B61BEF0D-F0BB-DE4B-95CE-6DB70DBA9567}" type="datetimeFigureOut">
               <a:rPr lang="en-US" dirty="0"/>
               <a:pPr/>
-              <a:t>12/13/2014</a:t>
+              <a:t>12/14/2014</a:t>
             </a:fld>
             <a:endParaRPr lang="en-US" dirty="0"/>
           </a:p>
@@ -2936,7 +2936,7 @@
             <a:fld id="{B61BEF0D-F0BB-DE4B-95CE-6DB70DBA9567}" type="datetimeFigureOut">
               <a:rPr lang="en-US" dirty="0"/>
               <a:pPr/>
-              <a:t>12/13/2014</a:t>
+              <a:t>12/14/2014</a:t>
             </a:fld>
             <a:endParaRPr lang="en-US" dirty="0"/>
           </a:p>
@@ -3113,7 +3113,7 @@
             <a:fld id="{B61BEF0D-F0BB-DE4B-95CE-6DB70DBA9567}" type="datetimeFigureOut">
               <a:rPr lang="en-US" dirty="0"/>
               <a:pPr/>
-              <a:t>12/13/2014</a:t>
+              <a:t>12/14/2014</a:t>
             </a:fld>
             <a:endParaRPr lang="en-US" dirty="0"/>
           </a:p>
@@ -3280,7 +3280,7 @@
             <a:fld id="{B61BEF0D-F0BB-DE4B-95CE-6DB70DBA9567}" type="datetimeFigureOut">
               <a:rPr lang="en-US" dirty="0"/>
               <a:pPr/>
-              <a:t>12/13/2014</a:t>
+              <a:t>12/14/2014</a:t>
             </a:fld>
             <a:endParaRPr lang="en-US" dirty="0"/>
           </a:p>
@@ -3528,7 +3528,7 @@
             <a:fld id="{B61BEF0D-F0BB-DE4B-95CE-6DB70DBA9567}" type="datetimeFigureOut">
               <a:rPr lang="en-US" dirty="0"/>
               <a:pPr/>
-              <a:t>12/13/2014</a:t>
+              <a:t>12/14/2014</a:t>
             </a:fld>
             <a:endParaRPr lang="en-US" dirty="0"/>
           </a:p>
@@ -3822,7 +3822,7 @@
             <a:fld id="{B61BEF0D-F0BB-DE4B-95CE-6DB70DBA9567}" type="datetimeFigureOut">
               <a:rPr lang="en-US" dirty="0"/>
               <a:pPr/>
-              <a:t>12/13/2014</a:t>
+              <a:t>12/14/2014</a:t>
             </a:fld>
             <a:endParaRPr lang="en-US" dirty="0"/>
           </a:p>
@@ -4261,7 +4261,7 @@
             <a:fld id="{B61BEF0D-F0BB-DE4B-95CE-6DB70DBA9567}" type="datetimeFigureOut">
               <a:rPr lang="en-US" dirty="0"/>
               <a:pPr/>
-              <a:t>12/13/2014</a:t>
+              <a:t>12/14/2014</a:t>
             </a:fld>
             <a:endParaRPr lang="en-US" dirty="0"/>
           </a:p>
@@ -4376,7 +4376,7 @@
             <a:fld id="{B61BEF0D-F0BB-DE4B-95CE-6DB70DBA9567}" type="datetimeFigureOut">
               <a:rPr lang="en-US" dirty="0"/>
               <a:pPr/>
-              <a:t>12/13/2014</a:t>
+              <a:t>12/14/2014</a:t>
             </a:fld>
             <a:endParaRPr lang="en-US" dirty="0"/>
           </a:p>
@@ -4468,7 +4468,7 @@
             <a:fld id="{B61BEF0D-F0BB-DE4B-95CE-6DB70DBA9567}" type="datetimeFigureOut">
               <a:rPr lang="en-US" dirty="0"/>
               <a:pPr/>
-              <a:t>12/13/2014</a:t>
+              <a:t>12/14/2014</a:t>
             </a:fld>
             <a:endParaRPr lang="en-US" dirty="0"/>
           </a:p>
@@ -4748,7 +4748,7 @@
             <a:fld id="{B61BEF0D-F0BB-DE4B-95CE-6DB70DBA9567}" type="datetimeFigureOut">
               <a:rPr lang="en-US" dirty="0"/>
               <a:pPr/>
-              <a:t>12/13/2014</a:t>
+              <a:t>12/14/2014</a:t>
             </a:fld>
             <a:endParaRPr lang="en-US" dirty="0"/>
           </a:p>
@@ -5036,7 +5036,7 @@
             <a:fld id="{B61BEF0D-F0BB-DE4B-95CE-6DB70DBA9567}" type="datetimeFigureOut">
               <a:rPr lang="en-US" dirty="0"/>
               <a:pPr/>
-              <a:t>12/13/2014</a:t>
+              <a:t>12/14/2014</a:t>
             </a:fld>
             <a:endParaRPr lang="en-US" dirty="0"/>
           </a:p>
@@ -5563,7 +5563,7 @@
             <a:fld id="{B61BEF0D-F0BB-DE4B-95CE-6DB70DBA9567}" type="datetimeFigureOut">
               <a:rPr lang="en-US" dirty="0"/>
               <a:pPr/>
-              <a:t>12/13/2014</a:t>
+              <a:t>12/14/2014</a:t>
             </a:fld>
             <a:endParaRPr lang="en-US" dirty="0"/>
           </a:p>
@@ -6437,25 +6437,35 @@
           </a:p>
         </p:txBody>
       </p:sp>
-      <p:sp>
-        <p:nvSpPr>
-          <p:cNvPr id="3" name="Content Placeholder 2"/>
-          <p:cNvSpPr>
-            <a:spLocks noGrp="1"/>
-          </p:cNvSpPr>
+      <p:pic>
+        <p:nvPicPr>
+          <p:cNvPr id="4" name="Content Placeholder 3"/>
+          <p:cNvPicPr>
+            <a:picLocks noGrp="1" noChangeAspect="1"/>
+          </p:cNvPicPr>
           <p:nvPr>
             <p:ph idx="1"/>
           </p:nvPr>
-        </p:nvSpPr>
-        <p:spPr/>
-        <p:txBody>
-          <a:bodyPr/>
-          <a:lstStyle/>
-          <a:p>
-            <a:endParaRPr lang="fr-FR"/>
-          </a:p>
-        </p:txBody>
-      </p:sp>
+        </p:nvPicPr>
+        <p:blipFill>
+          <a:blip r:embed="rId2">
+            <a:extLst>
+              <a:ext uri="{28A0092B-C50C-407E-A947-70E740481C1C}">
+                <a14:useLocalDpi xmlns:a14="http://schemas.microsoft.com/office/drawing/2010/main" val="0"/>
+              </a:ext>
+            </a:extLst>
+          </a:blip>
+          <a:stretch>
+            <a:fillRect/>
+          </a:stretch>
+        </p:blipFill>
+        <p:spPr>
+          <a:xfrm>
+            <a:off x="3090386" y="2054809"/>
+            <a:ext cx="6806562" cy="4328819"/>
+          </a:xfrm>
+        </p:spPr>
+      </p:pic>
     </p:spTree>
     <p:extLst>
       <p:ext uri="{BB962C8B-B14F-4D97-AF65-F5344CB8AC3E}">
@@ -6630,11 +6640,7 @@
           <a:p>
             <a:r>
               <a:rPr lang="fr-FR" dirty="0" smtClean="0"/>
-              <a:t>Webcam USB : à </a:t>
-            </a:r>
-            <a:r>
-              <a:rPr lang="fr-FR" dirty="0" smtClean="0"/>
-              <a:t>choisir (</a:t>
+              <a:t>Webcam USB : à choisir (</a:t>
             </a:r>
             <a:r>
               <a:rPr lang="fr-FR" dirty="0" err="1" smtClean="0"/>
@@ -6701,11 +6707,7 @@
           <a:p>
             <a:r>
               <a:rPr lang="fr-FR" dirty="0" smtClean="0"/>
-              <a:t>Projecteur : à </a:t>
-            </a:r>
-            <a:r>
-              <a:rPr lang="fr-FR" dirty="0" smtClean="0"/>
-              <a:t>choisir (port HDMI)</a:t>
+              <a:t>Projecteur : à choisir (port HDMI)</a:t>
             </a:r>
             <a:endParaRPr lang="fr-FR" dirty="0"/>
           </a:p>
@@ -6787,15 +6789,7 @@
           <a:p>
             <a:r>
               <a:rPr lang="fr-FR" dirty="0" smtClean="0"/>
-              <a:t>Solutions </a:t>
-            </a:r>
-            <a:r>
-              <a:rPr lang="fr-FR" dirty="0" smtClean="0"/>
-              <a:t>envisageables pour </a:t>
-            </a:r>
-            <a:r>
-              <a:rPr lang="fr-FR" dirty="0" smtClean="0"/>
-              <a:t>gérer les effets</a:t>
+              <a:t>Solutions envisageables pour gérer les effets</a:t>
             </a:r>
             <a:endParaRPr lang="fr-FR" dirty="0"/>
           </a:p>

</xml_diff>